<commit_message>
feat: white theme, simplified language, fixed VirusTotal API, added floating chat button
</commit_message>
<xml_diff>
--- a/CyberGuardian_Presentation.pptx
+++ b/CyberGuardian_Presentation.pptx
@@ -1,20 +1,20 @@
 
 <file path=ppt/presentation.xml><?xml version="1.0" encoding="utf-8"?>
-<p:presentation xmlns:a="http://schemas.openxmlformats.org/drawingml/2006/main" xmlns:r="http://schemas.openxmlformats.org/officeDocument/2006/relationships" xmlns:p="http://schemas.openxmlformats.org/presentationml/2006/main" saveSubsetFonts="1" autoCompressPictures="0">
+<p:presentation xmlns:a="http://schemas.openxmlformats.org/drawingml/2006/main" xmlns:r="http://schemas.openxmlformats.org/officeDocument/2006/relationships" xmlns:p="http://schemas.openxmlformats.org/presentationml/2006/main" autoCompressPictures="0">
   <p:sldMasterIdLst>
     <p:sldMasterId id="2147483648" r:id="rId1"/>
   </p:sldMasterIdLst>
   <p:sldIdLst>
-    <p:sldId id="256" r:id="rId7"/>
-    <p:sldId id="257" r:id="rId8"/>
-    <p:sldId id="258" r:id="rId9"/>
-    <p:sldId id="259" r:id="rId10"/>
-    <p:sldId id="260" r:id="rId11"/>
-    <p:sldId id="261" r:id="rId12"/>
-    <p:sldId id="262" r:id="rId13"/>
-    <p:sldId id="263" r:id="rId14"/>
-    <p:sldId id="264" r:id="rId15"/>
-    <p:sldId id="265" r:id="rId16"/>
+    <p:sldId id="256" r:id="rId3"/>
+    <p:sldId id="257" r:id="rId4"/>
+    <p:sldId id="258" r:id="rId5"/>
+    <p:sldId id="259" r:id="rId6"/>
+    <p:sldId id="260" r:id="rId7"/>
+    <p:sldId id="261" r:id="rId8"/>
+    <p:sldId id="262" r:id="rId9"/>
+    <p:sldId id="263" r:id="rId10"/>
+    <p:sldId id="264" r:id="rId11"/>
+    <p:sldId id="265" r:id="rId12"/>
   </p:sldIdLst>
   <p:sldSz cx="9144000" cy="6858000" type="screen4x3"/>
   <p:notesSz cx="6858000" cy="9144000"/>
@@ -113,6 +113,22 @@
       </a:defRPr>
     </a:lvl9pPr>
   </p:defaultTextStyle>
+  <p:extLst>
+    <p:ext uri="{EFAFB233-063F-42B5-8137-9DF3F51BA10A}">
+      <p15:sldGuideLst xmlns:p15="http://schemas.microsoft.com/office/powerpoint/2012/main">
+        <p15:guide id="1" orient="horz" pos="2160" userDrawn="1">
+          <p15:clr>
+            <a:srgbClr val="A4A3A4"/>
+          </p15:clr>
+        </p15:guide>
+        <p15:guide id="2" pos="2880" userDrawn="1">
+          <p15:clr>
+            <a:srgbClr val="A4A3A4"/>
+          </p15:clr>
+        </p15:guide>
+      </p15:sldGuideLst>
+    </p:ext>
+  </p:extLst>
 </p:presentation>
 </file>
 
@@ -297,7 +313,6 @@
           <a:p>
             <a:fld id="{5BCAD085-E8A6-8845-BD4E-CB4CCA059FC4}" type="datetimeFigureOut">
               <a:rPr lang="en-US" smtClean="0"/>
-              <a:t>1/27/13</a:t>
             </a:fld>
             <a:endParaRPr lang="en-US"/>
           </a:p>
@@ -339,18 +354,12 @@
           <a:p>
             <a:fld id="{C1FF6DA9-008F-8B48-92A6-B652298478BF}" type="slidenum">
               <a:rPr lang="en-US" smtClean="0"/>
-              <a:t>‹#›</a:t>
             </a:fld>
             <a:endParaRPr lang="en-US"/>
           </a:p>
         </p:txBody>
       </p:sp>
     </p:spTree>
-    <p:extLst>
-      <p:ext uri="{BB962C8B-B14F-4D97-AF65-F5344CB8AC3E}">
-        <p14:creationId xmlns:p14="http://schemas.microsoft.com/office/powerpoint/2010/main" val="3168075583"/>
-      </p:ext>
-    </p:extLst>
   </p:cSld>
   <p:clrMapOvr>
     <a:masterClrMapping/>
@@ -418,6 +427,7 @@
               <a:rPr lang="en-US" smtClean="0"/>
               <a:t>Click to edit Master text styles</a:t>
             </a:r>
+            <a:endParaRPr lang="en-US" smtClean="0"/>
           </a:p>
           <a:p>
             <a:pPr lvl="1"/>
@@ -425,6 +435,7 @@
               <a:rPr lang="en-US" smtClean="0"/>
               <a:t>Second level</a:t>
             </a:r>
+            <a:endParaRPr lang="en-US" smtClean="0"/>
           </a:p>
           <a:p>
             <a:pPr lvl="2"/>
@@ -432,6 +443,7 @@
               <a:rPr lang="en-US" smtClean="0"/>
               <a:t>Third level</a:t>
             </a:r>
+            <a:endParaRPr lang="en-US" smtClean="0"/>
           </a:p>
           <a:p>
             <a:pPr lvl="3"/>
@@ -439,6 +451,7 @@
               <a:rPr lang="en-US" smtClean="0"/>
               <a:t>Fourth level</a:t>
             </a:r>
+            <a:endParaRPr lang="en-US" smtClean="0"/>
           </a:p>
           <a:p>
             <a:pPr lvl="4"/>
@@ -467,7 +480,6 @@
           <a:p>
             <a:fld id="{5BCAD085-E8A6-8845-BD4E-CB4CCA059FC4}" type="datetimeFigureOut">
               <a:rPr lang="en-US" smtClean="0"/>
-              <a:t>1/27/13</a:t>
             </a:fld>
             <a:endParaRPr lang="en-US"/>
           </a:p>
@@ -509,18 +521,12 @@
           <a:p>
             <a:fld id="{C1FF6DA9-008F-8B48-92A6-B652298478BF}" type="slidenum">
               <a:rPr lang="en-US" smtClean="0"/>
-              <a:t>‹#›</a:t>
             </a:fld>
             <a:endParaRPr lang="en-US"/>
           </a:p>
         </p:txBody>
       </p:sp>
     </p:spTree>
-    <p:extLst>
-      <p:ext uri="{BB962C8B-B14F-4D97-AF65-F5344CB8AC3E}">
-        <p14:creationId xmlns:p14="http://schemas.microsoft.com/office/powerpoint/2010/main" val="2910927964"/>
-      </p:ext>
-    </p:extLst>
   </p:cSld>
   <p:clrMapOvr>
     <a:masterClrMapping/>
@@ -598,6 +604,7 @@
               <a:rPr lang="en-US" smtClean="0"/>
               <a:t>Click to edit Master text styles</a:t>
             </a:r>
+            <a:endParaRPr lang="en-US" smtClean="0"/>
           </a:p>
           <a:p>
             <a:pPr lvl="1"/>
@@ -605,6 +612,7 @@
               <a:rPr lang="en-US" smtClean="0"/>
               <a:t>Second level</a:t>
             </a:r>
+            <a:endParaRPr lang="en-US" smtClean="0"/>
           </a:p>
           <a:p>
             <a:pPr lvl="2"/>
@@ -612,6 +620,7 @@
               <a:rPr lang="en-US" smtClean="0"/>
               <a:t>Third level</a:t>
             </a:r>
+            <a:endParaRPr lang="en-US" smtClean="0"/>
           </a:p>
           <a:p>
             <a:pPr lvl="3"/>
@@ -619,6 +628,7 @@
               <a:rPr lang="en-US" smtClean="0"/>
               <a:t>Fourth level</a:t>
             </a:r>
+            <a:endParaRPr lang="en-US" smtClean="0"/>
           </a:p>
           <a:p>
             <a:pPr lvl="4"/>
@@ -647,7 +657,6 @@
           <a:p>
             <a:fld id="{5BCAD085-E8A6-8845-BD4E-CB4CCA059FC4}" type="datetimeFigureOut">
               <a:rPr lang="en-US" smtClean="0"/>
-              <a:t>1/27/13</a:t>
             </a:fld>
             <a:endParaRPr lang="en-US"/>
           </a:p>
@@ -689,18 +698,12 @@
           <a:p>
             <a:fld id="{C1FF6DA9-008F-8B48-92A6-B652298478BF}" type="slidenum">
               <a:rPr lang="en-US" smtClean="0"/>
-              <a:t>‹#›</a:t>
             </a:fld>
             <a:endParaRPr lang="en-US"/>
           </a:p>
         </p:txBody>
       </p:sp>
     </p:spTree>
-    <p:extLst>
-      <p:ext uri="{BB962C8B-B14F-4D97-AF65-F5344CB8AC3E}">
-        <p14:creationId xmlns:p14="http://schemas.microsoft.com/office/powerpoint/2010/main" val="3612223792"/>
-      </p:ext>
-    </p:extLst>
   </p:cSld>
   <p:clrMapOvr>
     <a:masterClrMapping/>
@@ -768,6 +771,7 @@
               <a:rPr lang="en-US" smtClean="0"/>
               <a:t>Click to edit Master text styles</a:t>
             </a:r>
+            <a:endParaRPr lang="en-US" smtClean="0"/>
           </a:p>
           <a:p>
             <a:pPr lvl="1"/>
@@ -775,6 +779,7 @@
               <a:rPr lang="en-US" smtClean="0"/>
               <a:t>Second level</a:t>
             </a:r>
+            <a:endParaRPr lang="en-US" smtClean="0"/>
           </a:p>
           <a:p>
             <a:pPr lvl="2"/>
@@ -782,6 +787,7 @@
               <a:rPr lang="en-US" smtClean="0"/>
               <a:t>Third level</a:t>
             </a:r>
+            <a:endParaRPr lang="en-US" smtClean="0"/>
           </a:p>
           <a:p>
             <a:pPr lvl="3"/>
@@ -789,6 +795,7 @@
               <a:rPr lang="en-US" smtClean="0"/>
               <a:t>Fourth level</a:t>
             </a:r>
+            <a:endParaRPr lang="en-US" smtClean="0"/>
           </a:p>
           <a:p>
             <a:pPr lvl="4"/>
@@ -817,7 +824,6 @@
           <a:p>
             <a:fld id="{5BCAD085-E8A6-8845-BD4E-CB4CCA059FC4}" type="datetimeFigureOut">
               <a:rPr lang="en-US" smtClean="0"/>
-              <a:t>1/27/13</a:t>
             </a:fld>
             <a:endParaRPr lang="en-US"/>
           </a:p>
@@ -859,18 +865,12 @@
           <a:p>
             <a:fld id="{C1FF6DA9-008F-8B48-92A6-B652298478BF}" type="slidenum">
               <a:rPr lang="en-US" smtClean="0"/>
-              <a:t>‹#›</a:t>
             </a:fld>
             <a:endParaRPr lang="en-US"/>
           </a:p>
         </p:txBody>
       </p:sp>
     </p:spTree>
-    <p:extLst>
-      <p:ext uri="{BB962C8B-B14F-4D97-AF65-F5344CB8AC3E}">
-        <p14:creationId xmlns:p14="http://schemas.microsoft.com/office/powerpoint/2010/main" val="2614314258"/>
-      </p:ext>
-    </p:extLst>
   </p:cSld>
   <p:clrMapOvr>
     <a:masterClrMapping/>
@@ -1043,6 +1043,7 @@
               <a:rPr lang="en-US" smtClean="0"/>
               <a:t>Click to edit Master text styles</a:t>
             </a:r>
+            <a:endParaRPr lang="en-US" smtClean="0"/>
           </a:p>
         </p:txBody>
       </p:sp>
@@ -1063,7 +1064,6 @@
           <a:p>
             <a:fld id="{5BCAD085-E8A6-8845-BD4E-CB4CCA059FC4}" type="datetimeFigureOut">
               <a:rPr lang="en-US" smtClean="0"/>
-              <a:t>1/27/13</a:t>
             </a:fld>
             <a:endParaRPr lang="en-US"/>
           </a:p>
@@ -1105,18 +1105,12 @@
           <a:p>
             <a:fld id="{C1FF6DA9-008F-8B48-92A6-B652298478BF}" type="slidenum">
               <a:rPr lang="en-US" smtClean="0"/>
-              <a:t>‹#›</a:t>
             </a:fld>
             <a:endParaRPr lang="en-US"/>
           </a:p>
         </p:txBody>
       </p:sp>
     </p:spTree>
-    <p:extLst>
-      <p:ext uri="{BB962C8B-B14F-4D97-AF65-F5344CB8AC3E}">
-        <p14:creationId xmlns:p14="http://schemas.microsoft.com/office/powerpoint/2010/main" val="960648375"/>
-      </p:ext>
-    </p:extLst>
   </p:cSld>
   <p:clrMapOvr>
     <a:masterClrMapping/>
@@ -1217,6 +1211,7 @@
               <a:rPr lang="en-US" smtClean="0"/>
               <a:t>Click to edit Master text styles</a:t>
             </a:r>
+            <a:endParaRPr lang="en-US" smtClean="0"/>
           </a:p>
           <a:p>
             <a:pPr lvl="1"/>
@@ -1224,6 +1219,7 @@
               <a:rPr lang="en-US" smtClean="0"/>
               <a:t>Second level</a:t>
             </a:r>
+            <a:endParaRPr lang="en-US" smtClean="0"/>
           </a:p>
           <a:p>
             <a:pPr lvl="2"/>
@@ -1231,6 +1227,7 @@
               <a:rPr lang="en-US" smtClean="0"/>
               <a:t>Third level</a:t>
             </a:r>
+            <a:endParaRPr lang="en-US" smtClean="0"/>
           </a:p>
           <a:p>
             <a:pPr lvl="3"/>
@@ -1238,6 +1235,7 @@
               <a:rPr lang="en-US" smtClean="0"/>
               <a:t>Fourth level</a:t>
             </a:r>
+            <a:endParaRPr lang="en-US" smtClean="0"/>
           </a:p>
           <a:p>
             <a:pPr lvl="4"/>
@@ -1302,6 +1300,7 @@
               <a:rPr lang="en-US" smtClean="0"/>
               <a:t>Click to edit Master text styles</a:t>
             </a:r>
+            <a:endParaRPr lang="en-US" smtClean="0"/>
           </a:p>
           <a:p>
             <a:pPr lvl="1"/>
@@ -1309,6 +1308,7 @@
               <a:rPr lang="en-US" smtClean="0"/>
               <a:t>Second level</a:t>
             </a:r>
+            <a:endParaRPr lang="en-US" smtClean="0"/>
           </a:p>
           <a:p>
             <a:pPr lvl="2"/>
@@ -1316,6 +1316,7 @@
               <a:rPr lang="en-US" smtClean="0"/>
               <a:t>Third level</a:t>
             </a:r>
+            <a:endParaRPr lang="en-US" smtClean="0"/>
           </a:p>
           <a:p>
             <a:pPr lvl="3"/>
@@ -1323,6 +1324,7 @@
               <a:rPr lang="en-US" smtClean="0"/>
               <a:t>Fourth level</a:t>
             </a:r>
+            <a:endParaRPr lang="en-US" smtClean="0"/>
           </a:p>
           <a:p>
             <a:pPr lvl="4"/>
@@ -1351,7 +1353,6 @@
           <a:p>
             <a:fld id="{5BCAD085-E8A6-8845-BD4E-CB4CCA059FC4}" type="datetimeFigureOut">
               <a:rPr lang="en-US" smtClean="0"/>
-              <a:t>1/27/13</a:t>
             </a:fld>
             <a:endParaRPr lang="en-US"/>
           </a:p>
@@ -1393,18 +1394,12 @@
           <a:p>
             <a:fld id="{C1FF6DA9-008F-8B48-92A6-B652298478BF}" type="slidenum">
               <a:rPr lang="en-US" smtClean="0"/>
-              <a:t>‹#›</a:t>
             </a:fld>
             <a:endParaRPr lang="en-US"/>
           </a:p>
         </p:txBody>
       </p:sp>
     </p:spTree>
-    <p:extLst>
-      <p:ext uri="{BB962C8B-B14F-4D97-AF65-F5344CB8AC3E}">
-        <p14:creationId xmlns:p14="http://schemas.microsoft.com/office/powerpoint/2010/main" val="2782244947"/>
-      </p:ext>
-    </p:extLst>
   </p:cSld>
   <p:clrMapOvr>
     <a:masterClrMapping/>
@@ -1518,6 +1513,7 @@
               <a:rPr lang="en-US" smtClean="0"/>
               <a:t>Click to edit Master text styles</a:t>
             </a:r>
+            <a:endParaRPr lang="en-US" smtClean="0"/>
           </a:p>
         </p:txBody>
       </p:sp>
@@ -1574,6 +1570,7 @@
               <a:rPr lang="en-US" smtClean="0"/>
               <a:t>Click to edit Master text styles</a:t>
             </a:r>
+            <a:endParaRPr lang="en-US" smtClean="0"/>
           </a:p>
           <a:p>
             <a:pPr lvl="1"/>
@@ -1581,6 +1578,7 @@
               <a:rPr lang="en-US" smtClean="0"/>
               <a:t>Second level</a:t>
             </a:r>
+            <a:endParaRPr lang="en-US" smtClean="0"/>
           </a:p>
           <a:p>
             <a:pPr lvl="2"/>
@@ -1588,6 +1586,7 @@
               <a:rPr lang="en-US" smtClean="0"/>
               <a:t>Third level</a:t>
             </a:r>
+            <a:endParaRPr lang="en-US" smtClean="0"/>
           </a:p>
           <a:p>
             <a:pPr lvl="3"/>
@@ -1595,6 +1594,7 @@
               <a:rPr lang="en-US" smtClean="0"/>
               <a:t>Fourth level</a:t>
             </a:r>
+            <a:endParaRPr lang="en-US" smtClean="0"/>
           </a:p>
           <a:p>
             <a:pPr lvl="4"/>
@@ -1668,6 +1668,7 @@
               <a:rPr lang="en-US" smtClean="0"/>
               <a:t>Click to edit Master text styles</a:t>
             </a:r>
+            <a:endParaRPr lang="en-US" smtClean="0"/>
           </a:p>
         </p:txBody>
       </p:sp>
@@ -1724,6 +1725,7 @@
               <a:rPr lang="en-US" smtClean="0"/>
               <a:t>Click to edit Master text styles</a:t>
             </a:r>
+            <a:endParaRPr lang="en-US" smtClean="0"/>
           </a:p>
           <a:p>
             <a:pPr lvl="1"/>
@@ -1731,6 +1733,7 @@
               <a:rPr lang="en-US" smtClean="0"/>
               <a:t>Second level</a:t>
             </a:r>
+            <a:endParaRPr lang="en-US" smtClean="0"/>
           </a:p>
           <a:p>
             <a:pPr lvl="2"/>
@@ -1738,6 +1741,7 @@
               <a:rPr lang="en-US" smtClean="0"/>
               <a:t>Third level</a:t>
             </a:r>
+            <a:endParaRPr lang="en-US" smtClean="0"/>
           </a:p>
           <a:p>
             <a:pPr lvl="3"/>
@@ -1745,6 +1749,7 @@
               <a:rPr lang="en-US" smtClean="0"/>
               <a:t>Fourth level</a:t>
             </a:r>
+            <a:endParaRPr lang="en-US" smtClean="0"/>
           </a:p>
           <a:p>
             <a:pPr lvl="4"/>
@@ -1773,7 +1778,6 @@
           <a:p>
             <a:fld id="{5BCAD085-E8A6-8845-BD4E-CB4CCA059FC4}" type="datetimeFigureOut">
               <a:rPr lang="en-US" smtClean="0"/>
-              <a:t>1/27/13</a:t>
             </a:fld>
             <a:endParaRPr lang="en-US"/>
           </a:p>
@@ -1815,18 +1819,12 @@
           <a:p>
             <a:fld id="{C1FF6DA9-008F-8B48-92A6-B652298478BF}" type="slidenum">
               <a:rPr lang="en-US" smtClean="0"/>
-              <a:t>‹#›</a:t>
             </a:fld>
             <a:endParaRPr lang="en-US"/>
           </a:p>
         </p:txBody>
       </p:sp>
     </p:spTree>
-    <p:extLst>
-      <p:ext uri="{BB962C8B-B14F-4D97-AF65-F5344CB8AC3E}">
-        <p14:creationId xmlns:p14="http://schemas.microsoft.com/office/powerpoint/2010/main" val="990158736"/>
-      </p:ext>
-    </p:extLst>
   </p:cSld>
   <p:clrMapOvr>
     <a:masterClrMapping/>
@@ -1891,7 +1889,6 @@
           <a:p>
             <a:fld id="{5BCAD085-E8A6-8845-BD4E-CB4CCA059FC4}" type="datetimeFigureOut">
               <a:rPr lang="en-US" smtClean="0"/>
-              <a:t>1/27/13</a:t>
             </a:fld>
             <a:endParaRPr lang="en-US"/>
           </a:p>
@@ -1933,18 +1930,12 @@
           <a:p>
             <a:fld id="{C1FF6DA9-008F-8B48-92A6-B652298478BF}" type="slidenum">
               <a:rPr lang="en-US" smtClean="0"/>
-              <a:t>‹#›</a:t>
             </a:fld>
             <a:endParaRPr lang="en-US"/>
           </a:p>
         </p:txBody>
       </p:sp>
     </p:spTree>
-    <p:extLst>
-      <p:ext uri="{BB962C8B-B14F-4D97-AF65-F5344CB8AC3E}">
-        <p14:creationId xmlns:p14="http://schemas.microsoft.com/office/powerpoint/2010/main" val="727027711"/>
-      </p:ext>
-    </p:extLst>
   </p:cSld>
   <p:clrMapOvr>
     <a:masterClrMapping/>
@@ -1986,7 +1977,6 @@
           <a:p>
             <a:fld id="{5BCAD085-E8A6-8845-BD4E-CB4CCA059FC4}" type="datetimeFigureOut">
               <a:rPr lang="en-US" smtClean="0"/>
-              <a:t>1/27/13</a:t>
             </a:fld>
             <a:endParaRPr lang="en-US"/>
           </a:p>
@@ -2028,18 +2018,12 @@
           <a:p>
             <a:fld id="{C1FF6DA9-008F-8B48-92A6-B652298478BF}" type="slidenum">
               <a:rPr lang="en-US" smtClean="0"/>
-              <a:t>‹#›</a:t>
             </a:fld>
             <a:endParaRPr lang="en-US"/>
           </a:p>
         </p:txBody>
       </p:sp>
     </p:spTree>
-    <p:extLst>
-      <p:ext uri="{BB962C8B-B14F-4D97-AF65-F5344CB8AC3E}">
-        <p14:creationId xmlns:p14="http://schemas.microsoft.com/office/powerpoint/2010/main" val="1212999818"/>
-      </p:ext>
-    </p:extLst>
   </p:cSld>
   <p:clrMapOvr>
     <a:masterClrMapping/>
@@ -2149,6 +2133,7 @@
               <a:rPr lang="en-US" smtClean="0"/>
               <a:t>Click to edit Master text styles</a:t>
             </a:r>
+            <a:endParaRPr lang="en-US" smtClean="0"/>
           </a:p>
           <a:p>
             <a:pPr lvl="1"/>
@@ -2156,6 +2141,7 @@
               <a:rPr lang="en-US" smtClean="0"/>
               <a:t>Second level</a:t>
             </a:r>
+            <a:endParaRPr lang="en-US" smtClean="0"/>
           </a:p>
           <a:p>
             <a:pPr lvl="2"/>
@@ -2163,6 +2149,7 @@
               <a:rPr lang="en-US" smtClean="0"/>
               <a:t>Third level</a:t>
             </a:r>
+            <a:endParaRPr lang="en-US" smtClean="0"/>
           </a:p>
           <a:p>
             <a:pPr lvl="3"/>
@@ -2170,6 +2157,7 @@
               <a:rPr lang="en-US" smtClean="0"/>
               <a:t>Fourth level</a:t>
             </a:r>
+            <a:endParaRPr lang="en-US" smtClean="0"/>
           </a:p>
           <a:p>
             <a:pPr lvl="4"/>
@@ -2243,6 +2231,7 @@
               <a:rPr lang="en-US" smtClean="0"/>
               <a:t>Click to edit Master text styles</a:t>
             </a:r>
+            <a:endParaRPr lang="en-US" smtClean="0"/>
           </a:p>
         </p:txBody>
       </p:sp>
@@ -2263,7 +2252,6 @@
           <a:p>
             <a:fld id="{5BCAD085-E8A6-8845-BD4E-CB4CCA059FC4}" type="datetimeFigureOut">
               <a:rPr lang="en-US" smtClean="0"/>
-              <a:t>1/27/13</a:t>
             </a:fld>
             <a:endParaRPr lang="en-US"/>
           </a:p>
@@ -2305,18 +2293,12 @@
           <a:p>
             <a:fld id="{C1FF6DA9-008F-8B48-92A6-B652298478BF}" type="slidenum">
               <a:rPr lang="en-US" smtClean="0"/>
-              <a:t>‹#›</a:t>
             </a:fld>
             <a:endParaRPr lang="en-US"/>
           </a:p>
         </p:txBody>
       </p:sp>
     </p:spTree>
-    <p:extLst>
-      <p:ext uri="{BB962C8B-B14F-4D97-AF65-F5344CB8AC3E}">
-        <p14:creationId xmlns:p14="http://schemas.microsoft.com/office/powerpoint/2010/main" val="1840726560"/>
-      </p:ext>
-    </p:extLst>
   </p:cSld>
   <p:clrMapOvr>
     <a:masterClrMapping/>
@@ -2496,6 +2478,7 @@
               <a:rPr lang="en-US" smtClean="0"/>
               <a:t>Click to edit Master text styles</a:t>
             </a:r>
+            <a:endParaRPr lang="en-US" smtClean="0"/>
           </a:p>
         </p:txBody>
       </p:sp>
@@ -2516,7 +2499,6 @@
           <a:p>
             <a:fld id="{5BCAD085-E8A6-8845-BD4E-CB4CCA059FC4}" type="datetimeFigureOut">
               <a:rPr lang="en-US" smtClean="0"/>
-              <a:t>1/27/13</a:t>
             </a:fld>
             <a:endParaRPr lang="en-US"/>
           </a:p>
@@ -2558,18 +2540,12 @@
           <a:p>
             <a:fld id="{C1FF6DA9-008F-8B48-92A6-B652298478BF}" type="slidenum">
               <a:rPr lang="en-US" smtClean="0"/>
-              <a:t>‹#›</a:t>
             </a:fld>
             <a:endParaRPr lang="en-US"/>
           </a:p>
         </p:txBody>
       </p:sp>
     </p:spTree>
-    <p:extLst>
-      <p:ext uri="{BB962C8B-B14F-4D97-AF65-F5344CB8AC3E}">
-        <p14:creationId xmlns:p14="http://schemas.microsoft.com/office/powerpoint/2010/main" val="3889236939"/>
-      </p:ext>
-    </p:extLst>
   </p:cSld>
   <p:clrMapOvr>
     <a:masterClrMapping/>
@@ -2662,6 +2638,7 @@
               <a:rPr lang="en-US" smtClean="0"/>
               <a:t>Click to edit Master text styles</a:t>
             </a:r>
+            <a:endParaRPr lang="en-US" smtClean="0"/>
           </a:p>
           <a:p>
             <a:pPr lvl="1"/>
@@ -2669,6 +2646,7 @@
               <a:rPr lang="en-US" smtClean="0"/>
               <a:t>Second level</a:t>
             </a:r>
+            <a:endParaRPr lang="en-US" smtClean="0"/>
           </a:p>
           <a:p>
             <a:pPr lvl="2"/>
@@ -2676,6 +2654,7 @@
               <a:rPr lang="en-US" smtClean="0"/>
               <a:t>Third level</a:t>
             </a:r>
+            <a:endParaRPr lang="en-US" smtClean="0"/>
           </a:p>
           <a:p>
             <a:pPr lvl="3"/>
@@ -2683,6 +2662,7 @@
               <a:rPr lang="en-US" smtClean="0"/>
               <a:t>Fourth level</a:t>
             </a:r>
+            <a:endParaRPr lang="en-US" smtClean="0"/>
           </a:p>
           <a:p>
             <a:pPr lvl="4"/>
@@ -2729,7 +2709,6 @@
           <a:p>
             <a:fld id="{5BCAD085-E8A6-8845-BD4E-CB4CCA059FC4}" type="datetimeFigureOut">
               <a:rPr lang="en-US" smtClean="0"/>
-              <a:t>1/27/13</a:t>
             </a:fld>
             <a:endParaRPr lang="en-US"/>
           </a:p>
@@ -2807,18 +2786,12 @@
           <a:p>
             <a:fld id="{C1FF6DA9-008F-8B48-92A6-B652298478BF}" type="slidenum">
               <a:rPr lang="en-US" smtClean="0"/>
-              <a:t>‹#›</a:t>
             </a:fld>
             <a:endParaRPr lang="en-US"/>
           </a:p>
         </p:txBody>
       </p:sp>
     </p:spTree>
-    <p:extLst>
-      <p:ext uri="{BB962C8B-B14F-4D97-AF65-F5344CB8AC3E}">
-        <p14:creationId xmlns:p14="http://schemas.microsoft.com/office/powerpoint/2010/main" val="2209977519"/>
-      </p:ext>
-    </p:extLst>
   </p:cSld>
   <p:clrMap bg1="lt1" tx1="dk1" bg2="lt2" tx2="dk2" accent1="accent1" accent2="accent2" accent3="accent3" accent4="accent4" accent5="accent5" accent6="accent6" hlink="hlink" folHlink="folHlink"/>
   <p:sldLayoutIdLst>
@@ -2856,7 +2829,7 @@
         <a:spcBef>
           <a:spcPct val="20000"/>
         </a:spcBef>
-        <a:buFont typeface="Arial"/>
+        <a:buFont typeface="Arial" panose="020B0604020202020204"/>
         <a:buChar char="•"/>
         <a:defRPr sz="3200" kern="1200">
           <a:solidFill>
@@ -2871,7 +2844,7 @@
         <a:spcBef>
           <a:spcPct val="20000"/>
         </a:spcBef>
-        <a:buFont typeface="Arial"/>
+        <a:buFont typeface="Arial" panose="020B0604020202020204"/>
         <a:buChar char="–"/>
         <a:defRPr sz="2800" kern="1200">
           <a:solidFill>
@@ -2886,7 +2859,7 @@
         <a:spcBef>
           <a:spcPct val="20000"/>
         </a:spcBef>
-        <a:buFont typeface="Arial"/>
+        <a:buFont typeface="Arial" panose="020B0604020202020204"/>
         <a:buChar char="•"/>
         <a:defRPr sz="2400" kern="1200">
           <a:solidFill>
@@ -2901,7 +2874,7 @@
         <a:spcBef>
           <a:spcPct val="20000"/>
         </a:spcBef>
-        <a:buFont typeface="Arial"/>
+        <a:buFont typeface="Arial" panose="020B0604020202020204"/>
         <a:buChar char="–"/>
         <a:defRPr sz="2000" kern="1200">
           <a:solidFill>
@@ -2916,7 +2889,7 @@
         <a:spcBef>
           <a:spcPct val="20000"/>
         </a:spcBef>
-        <a:buFont typeface="Arial"/>
+        <a:buFont typeface="Arial" panose="020B0604020202020204"/>
         <a:buChar char="»"/>
         <a:defRPr sz="2000" kern="1200">
           <a:solidFill>
@@ -2931,7 +2904,7 @@
         <a:spcBef>
           <a:spcPct val="20000"/>
         </a:spcBef>
-        <a:buFont typeface="Arial"/>
+        <a:buFont typeface="Arial" panose="020B0604020202020204"/>
         <a:buChar char="•"/>
         <a:defRPr sz="2000" kern="1200">
           <a:solidFill>
@@ -2946,7 +2919,7 @@
         <a:spcBef>
           <a:spcPct val="20000"/>
         </a:spcBef>
-        <a:buFont typeface="Arial"/>
+        <a:buFont typeface="Arial" panose="020B0604020202020204"/>
         <a:buChar char="•"/>
         <a:defRPr sz="2000" kern="1200">
           <a:solidFill>
@@ -2961,7 +2934,7 @@
         <a:spcBef>
           <a:spcPct val="20000"/>
         </a:spcBef>
-        <a:buFont typeface="Arial"/>
+        <a:buFont typeface="Arial" panose="020B0604020202020204"/>
         <a:buChar char="•"/>
         <a:defRPr sz="2000" kern="1200">
           <a:solidFill>
@@ -2976,7 +2949,7 @@
         <a:spcBef>
           <a:spcPct val="20000"/>
         </a:spcBef>
-        <a:buFont typeface="Arial"/>
+        <a:buFont typeface="Arial" panose="020B0604020202020204"/>
         <a:buChar char="•"/>
         <a:defRPr sz="2000" kern="1200">
           <a:solidFill>
@@ -3088,7 +3061,7 @@
 </file>
 
 <file path=ppt/slides/slide1.xml><?xml version="1.0" encoding="utf-8"?>
-<p:sld xmlns:a="http://schemas.openxmlformats.org/drawingml/2006/main" xmlns:p="http://schemas.openxmlformats.org/presentationml/2006/main" xmlns:r="http://schemas.openxmlformats.org/officeDocument/2006/relationships">
+<p:sld xmlns:a="http://schemas.openxmlformats.org/drawingml/2006/main" xmlns:r="http://schemas.openxmlformats.org/officeDocument/2006/relationships" xmlns:p="http://schemas.openxmlformats.org/presentationml/2006/main">
   <p:cSld>
     <p:bg>
       <p:bgPr>
@@ -3113,8 +3086,8 @@
         </p:nvSpPr>
         <p:spPr>
           <a:xfrm>
-            <a:off x="457200" y="2286000"/>
-            <a:ext cx="8229600" cy="1371600"/>
+            <a:off x="710248" y="2286000"/>
+            <a:ext cx="7723505" cy="1106805"/>
           </a:xfrm>
           <a:prstGeom prst="rect">
             <a:avLst/>
@@ -3135,7 +3108,14 @@
               </a:defRPr>
             </a:pPr>
             <a:r>
-              <a:t>🛡️ CyberGuardian AI</a:t>
+              <a:t>🛡</a:t>
+            </a:r>
+            <a:r>
+              <a:rPr lang="en-US"/>
+              <a:t>   </a:t>
+            </a:r>
+            <a:r>
+              <a:t>CyberGuardian AI</a:t>
             </a:r>
           </a:p>
         </p:txBody>
@@ -3219,7 +3199,7 @@
 </file>
 
 <file path=ppt/slides/slide10.xml><?xml version="1.0" encoding="utf-8"?>
-<p:sld xmlns:a="http://schemas.openxmlformats.org/drawingml/2006/main" xmlns:p="http://schemas.openxmlformats.org/presentationml/2006/main" xmlns:r="http://schemas.openxmlformats.org/officeDocument/2006/relationships">
+<p:sld xmlns:a="http://schemas.openxmlformats.org/drawingml/2006/main" xmlns:r="http://schemas.openxmlformats.org/officeDocument/2006/relationships" xmlns:p="http://schemas.openxmlformats.org/presentationml/2006/main">
   <p:cSld>
     <p:bg>
       <p:bgPr>
@@ -3414,7 +3394,7 @@
 </file>
 
 <file path=ppt/slides/slide2.xml><?xml version="1.0" encoding="utf-8"?>
-<p:sld xmlns:a="http://schemas.openxmlformats.org/drawingml/2006/main" xmlns:p="http://schemas.openxmlformats.org/presentationml/2006/main" xmlns:r="http://schemas.openxmlformats.org/officeDocument/2006/relationships">
+<p:sld xmlns:a="http://schemas.openxmlformats.org/drawingml/2006/main" xmlns:r="http://schemas.openxmlformats.org/officeDocument/2006/relationships" xmlns:p="http://schemas.openxmlformats.org/presentationml/2006/main">
   <p:cSld>
     <p:bg>
       <p:bgPr>
@@ -3588,7 +3568,7 @@
 </file>
 
 <file path=ppt/slides/slide3.xml><?xml version="1.0" encoding="utf-8"?>
-<p:sld xmlns:a="http://schemas.openxmlformats.org/drawingml/2006/main" xmlns:p="http://schemas.openxmlformats.org/presentationml/2006/main" xmlns:r="http://schemas.openxmlformats.org/officeDocument/2006/relationships">
+<p:sld xmlns:a="http://schemas.openxmlformats.org/drawingml/2006/main" xmlns:r="http://schemas.openxmlformats.org/officeDocument/2006/relationships" xmlns:p="http://schemas.openxmlformats.org/presentationml/2006/main">
   <p:cSld>
     <p:bg>
       <p:bgPr>
@@ -3799,7 +3779,7 @@
 </file>
 
 <file path=ppt/slides/slide4.xml><?xml version="1.0" encoding="utf-8"?>
-<p:sld xmlns:a="http://schemas.openxmlformats.org/drawingml/2006/main" xmlns:p="http://schemas.openxmlformats.org/presentationml/2006/main" xmlns:r="http://schemas.openxmlformats.org/officeDocument/2006/relationships">
+<p:sld xmlns:a="http://schemas.openxmlformats.org/drawingml/2006/main" xmlns:r="http://schemas.openxmlformats.org/officeDocument/2006/relationships" xmlns:p="http://schemas.openxmlformats.org/presentationml/2006/main">
   <p:cSld>
     <p:bg>
       <p:bgPr>
@@ -4095,7 +4075,7 @@
 </file>
 
 <file path=ppt/slides/slide5.xml><?xml version="1.0" encoding="utf-8"?>
-<p:sld xmlns:a="http://schemas.openxmlformats.org/drawingml/2006/main" xmlns:p="http://schemas.openxmlformats.org/presentationml/2006/main" xmlns:r="http://schemas.openxmlformats.org/officeDocument/2006/relationships">
+<p:sld xmlns:a="http://schemas.openxmlformats.org/drawingml/2006/main" xmlns:r="http://schemas.openxmlformats.org/officeDocument/2006/relationships" xmlns:p="http://schemas.openxmlformats.org/presentationml/2006/main">
   <p:cSld>
     <p:bg>
       <p:bgPr>
@@ -4244,7 +4224,7 @@
 </file>
 
 <file path=ppt/slides/slide6.xml><?xml version="1.0" encoding="utf-8"?>
-<p:sld xmlns:a="http://schemas.openxmlformats.org/drawingml/2006/main" xmlns:p="http://schemas.openxmlformats.org/presentationml/2006/main" xmlns:r="http://schemas.openxmlformats.org/officeDocument/2006/relationships">
+<p:sld xmlns:a="http://schemas.openxmlformats.org/drawingml/2006/main" xmlns:r="http://schemas.openxmlformats.org/officeDocument/2006/relationships" xmlns:p="http://schemas.openxmlformats.org/presentationml/2006/main">
   <p:cSld>
     <p:bg>
       <p:bgPr>
@@ -4403,7 +4383,7 @@
 </file>
 
 <file path=ppt/slides/slide7.xml><?xml version="1.0" encoding="utf-8"?>
-<p:sld xmlns:a="http://schemas.openxmlformats.org/drawingml/2006/main" xmlns:p="http://schemas.openxmlformats.org/presentationml/2006/main" xmlns:r="http://schemas.openxmlformats.org/officeDocument/2006/relationships">
+<p:sld xmlns:a="http://schemas.openxmlformats.org/drawingml/2006/main" xmlns:r="http://schemas.openxmlformats.org/officeDocument/2006/relationships" xmlns:p="http://schemas.openxmlformats.org/presentationml/2006/main">
   <p:cSld>
     <p:bg>
       <p:bgPr>
@@ -4589,7 +4569,7 @@
 </file>
 
 <file path=ppt/slides/slide8.xml><?xml version="1.0" encoding="utf-8"?>
-<p:sld xmlns:a="http://schemas.openxmlformats.org/drawingml/2006/main" xmlns:p="http://schemas.openxmlformats.org/presentationml/2006/main" xmlns:r="http://schemas.openxmlformats.org/officeDocument/2006/relationships">
+<p:sld xmlns:a="http://schemas.openxmlformats.org/drawingml/2006/main" xmlns:r="http://schemas.openxmlformats.org/officeDocument/2006/relationships" xmlns:p="http://schemas.openxmlformats.org/presentationml/2006/main">
   <p:cSld>
     <p:bg>
       <p:bgPr>
@@ -4850,7 +4830,7 @@
 </file>
 
 <file path=ppt/slides/slide9.xml><?xml version="1.0" encoding="utf-8"?>
-<p:sld xmlns:a="http://schemas.openxmlformats.org/drawingml/2006/main" xmlns:p="http://schemas.openxmlformats.org/presentationml/2006/main" xmlns:r="http://schemas.openxmlformats.org/officeDocument/2006/relationships">
+<p:sld xmlns:a="http://schemas.openxmlformats.org/drawingml/2006/main" xmlns:r="http://schemas.openxmlformats.org/officeDocument/2006/relationships" xmlns:p="http://schemas.openxmlformats.org/presentationml/2006/main">
   <p:cSld>
     <p:bg>
       <p:bgPr>
@@ -5324,6 +5304,10 @@
       </a:style>
     </a:lnDef>
   </a:objectDefaults>
-  <a:extraClrSchemeLst/>
+  <a:extLst>
+    <a:ext uri="{05A4C25C-085E-4340-85A3-A5531E510DB2}">
+      <thm15:themeFamily xmlns:thm15="http://schemas.microsoft.com/office/thememl/2012/main" name="Office Theme" id="{62F939B6-93AF-4DB8-9C6B-D6C7DFDC589F}" vid="{4A3C46E8-61CC-4603-A589-7422A47A8E4A}"/>
+    </a:ext>
+  </a:extLst>
 </a:theme>
 </file>
</xml_diff>